<commit_message>
Update Poster design and object detection sections
</commit_message>
<xml_diff>
--- a/submission/project-poster.pptx
+++ b/submission/project-poster.pptx
@@ -208,7 +208,7 @@
           <a:p>
             <a:fld id="{3150FDD1-E802-4B61-BB15-40BE78DAD272}" type="datetimeFigureOut">
               <a:rPr lang="en-US" smtClean="0"/>
-              <a:t>5/1/2022</a:t>
+              <a:t>5/4/2022</a:t>
             </a:fld>
             <a:endParaRPr lang="en-US" dirty="0"/>
           </a:p>
@@ -738,7 +738,7 @@
           <a:p>
             <a:fld id="{E350CF23-4F62-8046-AF6A-DE4F04AD794B}" type="datetimeFigureOut">
               <a:rPr lang="en-US" smtClean="0"/>
-              <a:t>5/1/2022</a:t>
+              <a:t>5/4/2022</a:t>
             </a:fld>
             <a:endParaRPr lang="en-US" dirty="0"/>
           </a:p>
@@ -906,7 +906,7 @@
           <a:p>
             <a:fld id="{E350CF23-4F62-8046-AF6A-DE4F04AD794B}" type="datetimeFigureOut">
               <a:rPr lang="en-US" smtClean="0"/>
-              <a:t>5/1/2022</a:t>
+              <a:t>5/4/2022</a:t>
             </a:fld>
             <a:endParaRPr lang="en-US" dirty="0"/>
           </a:p>
@@ -1084,7 +1084,7 @@
           <a:p>
             <a:fld id="{E350CF23-4F62-8046-AF6A-DE4F04AD794B}" type="datetimeFigureOut">
               <a:rPr lang="en-US" smtClean="0"/>
-              <a:t>5/1/2022</a:t>
+              <a:t>5/4/2022</a:t>
             </a:fld>
             <a:endParaRPr lang="en-US" dirty="0"/>
           </a:p>
@@ -1252,7 +1252,7 @@
           <a:p>
             <a:fld id="{E350CF23-4F62-8046-AF6A-DE4F04AD794B}" type="datetimeFigureOut">
               <a:rPr lang="en-US" smtClean="0"/>
-              <a:t>5/1/2022</a:t>
+              <a:t>5/4/2022</a:t>
             </a:fld>
             <a:endParaRPr lang="en-US" dirty="0"/>
           </a:p>
@@ -1497,7 +1497,7 @@
           <a:p>
             <a:fld id="{E350CF23-4F62-8046-AF6A-DE4F04AD794B}" type="datetimeFigureOut">
               <a:rPr lang="en-US" smtClean="0"/>
-              <a:t>5/1/2022</a:t>
+              <a:t>5/4/2022</a:t>
             </a:fld>
             <a:endParaRPr lang="en-US" dirty="0"/>
           </a:p>
@@ -1782,7 +1782,7 @@
           <a:p>
             <a:fld id="{E350CF23-4F62-8046-AF6A-DE4F04AD794B}" type="datetimeFigureOut">
               <a:rPr lang="en-US" smtClean="0"/>
-              <a:t>5/1/2022</a:t>
+              <a:t>5/4/2022</a:t>
             </a:fld>
             <a:endParaRPr lang="en-US" dirty="0"/>
           </a:p>
@@ -2206,7 +2206,7 @@
           <a:p>
             <a:fld id="{E350CF23-4F62-8046-AF6A-DE4F04AD794B}" type="datetimeFigureOut">
               <a:rPr lang="en-US" smtClean="0"/>
-              <a:t>5/1/2022</a:t>
+              <a:t>5/4/2022</a:t>
             </a:fld>
             <a:endParaRPr lang="en-US" dirty="0"/>
           </a:p>
@@ -2323,7 +2323,7 @@
           <a:p>
             <a:fld id="{E350CF23-4F62-8046-AF6A-DE4F04AD794B}" type="datetimeFigureOut">
               <a:rPr lang="en-US" smtClean="0"/>
-              <a:t>5/1/2022</a:t>
+              <a:t>5/4/2022</a:t>
             </a:fld>
             <a:endParaRPr lang="en-US" dirty="0"/>
           </a:p>
@@ -2418,7 +2418,7 @@
           <a:p>
             <a:fld id="{E350CF23-4F62-8046-AF6A-DE4F04AD794B}" type="datetimeFigureOut">
               <a:rPr lang="en-US" smtClean="0"/>
-              <a:t>5/1/2022</a:t>
+              <a:t>5/4/2022</a:t>
             </a:fld>
             <a:endParaRPr lang="en-US" dirty="0"/>
           </a:p>
@@ -2693,7 +2693,7 @@
           <a:p>
             <a:fld id="{E350CF23-4F62-8046-AF6A-DE4F04AD794B}" type="datetimeFigureOut">
               <a:rPr lang="en-US" smtClean="0"/>
-              <a:t>5/1/2022</a:t>
+              <a:t>5/4/2022</a:t>
             </a:fld>
             <a:endParaRPr lang="en-US" dirty="0"/>
           </a:p>
@@ -2945,7 +2945,7 @@
           <a:p>
             <a:fld id="{E350CF23-4F62-8046-AF6A-DE4F04AD794B}" type="datetimeFigureOut">
               <a:rPr lang="en-US" smtClean="0"/>
-              <a:t>5/1/2022</a:t>
+              <a:t>5/4/2022</a:t>
             </a:fld>
             <a:endParaRPr lang="en-US" dirty="0"/>
           </a:p>
@@ -3156,7 +3156,7 @@
           <a:p>
             <a:fld id="{E350CF23-4F62-8046-AF6A-DE4F04AD794B}" type="datetimeFigureOut">
               <a:rPr lang="en-US" smtClean="0"/>
-              <a:t>5/1/2022</a:t>
+              <a:t>5/4/2022</a:t>
             </a:fld>
             <a:endParaRPr lang="en-US" dirty="0"/>
           </a:p>
@@ -3603,16 +3603,11 @@
           <a:p>
             <a:pPr algn="ctr"/>
             <a:r>
-              <a:rPr lang="en-US" sz="5600" b="1" dirty="0"/>
-              <a:t>Football-Mapper:</a:t>
-            </a:r>
-            <a:r>
-              <a:rPr lang="en-US" sz="5600" b="1" i="1" dirty="0"/>
-              <a:t> </a:t>
-            </a:r>
-            <a:r>
-              <a:rPr lang="en-US" sz="5600" dirty="0"/>
-              <a:t>A Project to Create A 2-D Map Representation of Football Games</a:t>
+              <a:rPr lang="en-US" sz="5600" dirty="0">
+                <a:latin typeface="Times New Roman" panose="02020603050405020304" pitchFamily="18" charset="0"/>
+                <a:cs typeface="Times New Roman" panose="02020603050405020304" pitchFamily="18" charset="0"/>
+              </a:rPr>
+              <a:t>Computer Vision Approach to Football Player Mapping</a:t>
             </a:r>
           </a:p>
         </p:txBody>
@@ -3676,15 +3671,24 @@
           <a:p>
             <a:pPr algn="ctr"/>
             <a:r>
-              <a:rPr lang="en-US" sz="3600" b="1" dirty="0"/>
-              <a:t>Bryant Cornwell, Seth Mize, Lukas Franz, </a:t>
-            </a:r>
-            <a:r>
-              <a:rPr lang="en-US" sz="3600" dirty="0" err="1"/>
+              <a:rPr lang="en-US" sz="3600" b="1" dirty="0">
+                <a:latin typeface="Times New Roman" panose="02020603050405020304" pitchFamily="18" charset="0"/>
+                <a:cs typeface="Times New Roman" panose="02020603050405020304" pitchFamily="18" charset="0"/>
+              </a:rPr>
+              <a:t>Bryant Cornwell, Seth Mize, Lucas Franz, </a:t>
+            </a:r>
+            <a:r>
+              <a:rPr lang="en-US" sz="3600" dirty="0" err="1">
+                <a:latin typeface="Times New Roman" panose="02020603050405020304" pitchFamily="18" charset="0"/>
+                <a:cs typeface="Times New Roman" panose="02020603050405020304" pitchFamily="18" charset="0"/>
+              </a:rPr>
               <a:t>Luddy</a:t>
             </a:r>
             <a:r>
-              <a:rPr lang="en-US" sz="3600" dirty="0"/>
+              <a:rPr lang="en-US" sz="3600" dirty="0">
+                <a:latin typeface="Times New Roman" panose="02020603050405020304" pitchFamily="18" charset="0"/>
+                <a:cs typeface="Times New Roman" panose="02020603050405020304" pitchFamily="18" charset="0"/>
+              </a:rPr>
               <a:t> School of Informatics, Computing, and Engineering, Indiana University</a:t>
             </a:r>
           </a:p>
@@ -3725,6 +3729,8 @@
                 <a:solidFill>
                   <a:schemeClr val="bg1"/>
                 </a:solidFill>
+                <a:latin typeface="Times New Roman" panose="02020603050405020304" pitchFamily="18" charset="0"/>
+                <a:cs typeface="Times New Roman" panose="02020603050405020304" pitchFamily="18" charset="0"/>
               </a:rPr>
               <a:t>Abstract</a:t>
             </a:r>
@@ -3739,7 +3745,7 @@
         </p:nvSpPr>
         <p:spPr>
           <a:xfrm>
-            <a:off x="46957" y="11022526"/>
+            <a:off x="46957" y="10676158"/>
             <a:ext cx="10787567" cy="707886"/>
           </a:xfrm>
           <a:prstGeom prst="rect">
@@ -3761,8 +3767,10 @@
                 <a:solidFill>
                   <a:schemeClr val="bg1"/>
                 </a:solidFill>
+                <a:latin typeface="Times New Roman" panose="02020603050405020304" pitchFamily="18" charset="0"/>
+                <a:cs typeface="Times New Roman" panose="02020603050405020304" pitchFamily="18" charset="0"/>
               </a:rPr>
-              <a:t>Introduction</a:t>
+              <a:t>Background</a:t>
             </a:r>
           </a:p>
         </p:txBody>
@@ -3797,6 +3805,8 @@
                 <a:solidFill>
                   <a:schemeClr val="bg1"/>
                 </a:solidFill>
+                <a:latin typeface="Times New Roman" panose="02020603050405020304" pitchFamily="18" charset="0"/>
+                <a:cs typeface="Times New Roman" panose="02020603050405020304" pitchFamily="18" charset="0"/>
               </a:rPr>
               <a:t>Methods</a:t>
             </a:r>
@@ -3907,6 +3917,8 @@
                 <a:solidFill>
                   <a:schemeClr val="bg1"/>
                 </a:solidFill>
+                <a:latin typeface="Times New Roman" panose="02020603050405020304" pitchFamily="18" charset="0"/>
+                <a:cs typeface="Times New Roman" panose="02020603050405020304" pitchFamily="18" charset="0"/>
               </a:rPr>
               <a:t>Results</a:t>
             </a:r>
@@ -3921,7 +3933,7 @@
         </p:nvSpPr>
         <p:spPr>
           <a:xfrm>
-            <a:off x="21769813" y="16242396"/>
+            <a:off x="21769813" y="14813646"/>
             <a:ext cx="11072388" cy="707886"/>
           </a:xfrm>
           <a:prstGeom prst="rect">
@@ -3943,6 +3955,8 @@
                 <a:solidFill>
                   <a:schemeClr val="bg1"/>
                 </a:solidFill>
+                <a:latin typeface="Times New Roman" panose="02020603050405020304" pitchFamily="18" charset="0"/>
+                <a:cs typeface="Times New Roman" panose="02020603050405020304" pitchFamily="18" charset="0"/>
               </a:rPr>
               <a:t>Conclusion</a:t>
             </a:r>
@@ -3999,7 +4013,7 @@
         <p:spPr>
           <a:xfrm>
             <a:off x="11044989" y="3633537"/>
-            <a:ext cx="10467473" cy="3970318"/>
+            <a:ext cx="10467473" cy="3662541"/>
           </a:xfrm>
           <a:prstGeom prst="rect">
             <a:avLst/>
@@ -4017,7 +4031,10 @@
               <a:buChar char="•"/>
             </a:pPr>
             <a:r>
-              <a:rPr lang="en-US" sz="3600" dirty="0"/>
+              <a:rPr lang="en-US" sz="3200" dirty="0">
+                <a:latin typeface="Times New Roman" panose="02020603050405020304" pitchFamily="18" charset="0"/>
+                <a:cs typeface="Times New Roman" panose="02020603050405020304" pitchFamily="18" charset="0"/>
+              </a:rPr>
               <a:t>Object Detection Model:</a:t>
             </a:r>
           </a:p>
@@ -4027,7 +4044,10 @@
               <a:buChar char="•"/>
             </a:pPr>
             <a:r>
-              <a:rPr lang="en-US" sz="3600" dirty="0"/>
+              <a:rPr lang="en-US" sz="3200" dirty="0">
+                <a:latin typeface="Times New Roman" panose="02020603050405020304" pitchFamily="18" charset="0"/>
+                <a:cs typeface="Times New Roman" panose="02020603050405020304" pitchFamily="18" charset="0"/>
+              </a:rPr>
               <a:t>Self-Labelled Image Dataset</a:t>
             </a:r>
           </a:p>
@@ -4037,8 +4057,11 @@
               <a:buChar char="•"/>
             </a:pPr>
             <a:r>
-              <a:rPr lang="en-US" sz="3600" dirty="0"/>
-              <a:t>TensorFlow 2 Object Detection API </a:t>
+              <a:rPr lang="en-US" sz="3200" dirty="0">
+                <a:latin typeface="Times New Roman" panose="02020603050405020304" pitchFamily="18" charset="0"/>
+                <a:cs typeface="Times New Roman" panose="02020603050405020304" pitchFamily="18" charset="0"/>
+              </a:rPr>
+              <a:t>TensorFlow 2 Object Detection API</a:t>
             </a:r>
           </a:p>
           <a:p>
@@ -4047,7 +4070,10 @@
               <a:buChar char="•"/>
             </a:pPr>
             <a:r>
-              <a:rPr lang="en-US" sz="3600" dirty="0"/>
+              <a:rPr lang="en-US" sz="3200" dirty="0">
+                <a:latin typeface="Times New Roman" panose="02020603050405020304" pitchFamily="18" charset="0"/>
+                <a:cs typeface="Times New Roman" panose="02020603050405020304" pitchFamily="18" charset="0"/>
+              </a:rPr>
               <a:t>Pre-Trained Model: Faster R-CNN with the COCO Dataset</a:t>
             </a:r>
           </a:p>
@@ -4078,7 +4104,7 @@
         <p:spPr>
           <a:xfrm>
             <a:off x="553453" y="3548805"/>
-            <a:ext cx="9601200" cy="6740307"/>
+            <a:ext cx="9601200" cy="6986528"/>
           </a:xfrm>
           <a:prstGeom prst="rect">
             <a:avLst/>
@@ -4092,8 +4118,374 @@
           <a:lstStyle/>
           <a:p>
             <a:r>
-              <a:rPr lang="en-US" sz="3600" dirty="0"/>
-              <a:t>The world of football analytics has grown in interest as more ideas for tracking players statistics and team movements continue to provide value to the industry. Tracking players is a familiar subject, but not applying an active overhead view using recorded or live footage. This project aims to use computer vision techniques to identify feature points and objects to transform their positions to a two-dimensional overhead field representation using available broadcast feed from football games. Our results provide _____ (Waiting on results)</a:t>
+              <a:rPr lang="en-US" sz="3200" dirty="0">
+                <a:latin typeface="Times New Roman" panose="02020603050405020304" pitchFamily="18" charset="0"/>
+                <a:cs typeface="Times New Roman" panose="02020603050405020304" pitchFamily="18" charset="0"/>
+              </a:rPr>
+              <a:t>Professional sports industries continue to increase their reliance upon analytics, one of the primary being the tracking of player movement. In football (soccer) this is even more prioritized as the game relies upon player positioning and movement on a vast playing surface. Modern techniques utilize wearable technology to accomplish this. This project argues that through the adaptation of existing computer vision techniques the same results can be achieved and democratized. Utilizing image channel thresholding, Hough Transformations, algebra, linear algebra, and a deep neural network, our results illustrate the possibilities of transforming player and ball locations from broadcast images into a 2-dimensional overhead coordinate space.</a:t>
+            </a:r>
+          </a:p>
+        </p:txBody>
+      </p:sp>
+      <p:sp>
+        <p:nvSpPr>
+          <p:cNvPr id="6" name="TextBox 5">
+            <a:extLst>
+              <a:ext uri="{FF2B5EF4-FFF2-40B4-BE49-F238E27FC236}">
+                <a16:creationId xmlns:a16="http://schemas.microsoft.com/office/drawing/2014/main" id="{01227473-9FF9-8F8B-3A2E-C1608ADFDAAA}"/>
+              </a:ext>
+            </a:extLst>
+          </p:cNvPr>
+          <p:cNvSpPr txBox="1"/>
+          <p:nvPr/>
+        </p:nvSpPr>
+        <p:spPr>
+          <a:xfrm>
+            <a:off x="553453" y="11963400"/>
+            <a:ext cx="9601199" cy="1569660"/>
+          </a:xfrm>
+          <a:prstGeom prst="rect">
+            <a:avLst/>
+          </a:prstGeom>
+          <a:noFill/>
+        </p:spPr>
+        <p:txBody>
+          <a:bodyPr wrap="square" rtlCol="0">
+            <a:spAutoFit/>
+          </a:bodyPr>
+          <a:lstStyle/>
+          <a:p>
+            <a:pPr marL="457200" indent="-457200">
+              <a:buFont typeface="Arial" panose="020B0604020202020204" pitchFamily="34" charset="0"/>
+              <a:buChar char="•"/>
+            </a:pPr>
+            <a:r>
+              <a:rPr lang="en-US" sz="3200" dirty="0">
+                <a:latin typeface="Times New Roman" panose="02020603050405020304" pitchFamily="18" charset="0"/>
+                <a:cs typeface="Times New Roman" panose="02020603050405020304" pitchFamily="18" charset="0"/>
+              </a:rPr>
+              <a:t>Previous work on football player detection and tracking have been explored using computer vision techniques recorded football games.</a:t>
+            </a:r>
+          </a:p>
+        </p:txBody>
+      </p:sp>
+      <p:sp>
+        <p:nvSpPr>
+          <p:cNvPr id="7" name="TextBox 6">
+            <a:extLst>
+              <a:ext uri="{FF2B5EF4-FFF2-40B4-BE49-F238E27FC236}">
+                <a16:creationId xmlns:a16="http://schemas.microsoft.com/office/drawing/2014/main" id="{BF7CC2BF-8F74-CA25-63B3-924F9BAE7678}"/>
+              </a:ext>
+            </a:extLst>
+          </p:cNvPr>
+          <p:cNvSpPr txBox="1"/>
+          <p:nvPr/>
+        </p:nvSpPr>
+        <p:spPr>
+          <a:xfrm>
+            <a:off x="22274050" y="16040100"/>
+            <a:ext cx="9672796" cy="1077218"/>
+          </a:xfrm>
+          <a:prstGeom prst="rect">
+            <a:avLst/>
+          </a:prstGeom>
+          <a:noFill/>
+        </p:spPr>
+        <p:txBody>
+          <a:bodyPr wrap="square" rtlCol="0">
+            <a:spAutoFit/>
+          </a:bodyPr>
+          <a:lstStyle/>
+          <a:p>
+            <a:pPr marL="857250" indent="-857250">
+              <a:buFont typeface="Arial" panose="020B0604020202020204" pitchFamily="34" charset="0"/>
+              <a:buChar char="•"/>
+            </a:pPr>
+            <a:r>
+              <a:rPr lang="en-US" sz="3200" dirty="0">
+                <a:latin typeface="Times New Roman" panose="02020603050405020304" pitchFamily="18" charset="0"/>
+                <a:cs typeface="Times New Roman" panose="02020603050405020304" pitchFamily="18" charset="0"/>
+              </a:rPr>
+              <a:t>Object recognition for event tracking and statistical analysis.</a:t>
+            </a:r>
+          </a:p>
+        </p:txBody>
+      </p:sp>
+      <p:pic>
+        <p:nvPicPr>
+          <p:cNvPr id="1026" name="Picture 2">
+            <a:extLst>
+              <a:ext uri="{FF2B5EF4-FFF2-40B4-BE49-F238E27FC236}">
+                <a16:creationId xmlns:a16="http://schemas.microsoft.com/office/drawing/2014/main" id="{0F8F0EDB-0445-05EF-91E4-929F125A51F5}"/>
+              </a:ext>
+            </a:extLst>
+          </p:cNvPr>
+          <p:cNvPicPr>
+            <a:picLocks noChangeAspect="1" noChangeArrowheads="1"/>
+          </p:cNvPicPr>
+          <p:nvPr/>
+        </p:nvPicPr>
+        <p:blipFill>
+          <a:blip r:embed="rId4">
+            <a:extLst>
+              <a:ext uri="{28A0092B-C50C-407E-A947-70E740481C1C}">
+                <a14:useLocalDpi xmlns:a14="http://schemas.microsoft.com/office/drawing/2010/main" val="0"/>
+              </a:ext>
+            </a:extLst>
+          </a:blip>
+          <a:srcRect/>
+          <a:stretch>
+            <a:fillRect/>
+          </a:stretch>
+        </p:blipFill>
+        <p:spPr bwMode="auto">
+          <a:xfrm>
+            <a:off x="22989508" y="3700642"/>
+            <a:ext cx="4417412" cy="2500133"/>
+          </a:xfrm>
+          <a:prstGeom prst="rect">
+            <a:avLst/>
+          </a:prstGeom>
+          <a:noFill/>
+          <a:extLst>
+            <a:ext uri="{909E8E84-426E-40DD-AFC4-6F175D3DCCD1}">
+              <a14:hiddenFill xmlns:a14="http://schemas.microsoft.com/office/drawing/2010/main">
+                <a:solidFill>
+                  <a:srgbClr val="FFFFFF"/>
+                </a:solidFill>
+              </a14:hiddenFill>
+            </a:ext>
+          </a:extLst>
+        </p:spPr>
+      </p:pic>
+      <p:pic>
+        <p:nvPicPr>
+          <p:cNvPr id="1028" name="Picture 4">
+            <a:extLst>
+              <a:ext uri="{FF2B5EF4-FFF2-40B4-BE49-F238E27FC236}">
+                <a16:creationId xmlns:a16="http://schemas.microsoft.com/office/drawing/2014/main" id="{465C02D3-4ACF-F2DE-E98E-FDEF66AD586A}"/>
+              </a:ext>
+            </a:extLst>
+          </p:cNvPr>
+          <p:cNvPicPr>
+            <a:picLocks noChangeAspect="1" noChangeArrowheads="1"/>
+          </p:cNvPicPr>
+          <p:nvPr/>
+        </p:nvPicPr>
+        <p:blipFill>
+          <a:blip r:embed="rId5">
+            <a:extLst>
+              <a:ext uri="{28A0092B-C50C-407E-A947-70E740481C1C}">
+                <a14:useLocalDpi xmlns:a14="http://schemas.microsoft.com/office/drawing/2010/main" val="0"/>
+              </a:ext>
+            </a:extLst>
+          </a:blip>
+          <a:srcRect/>
+          <a:stretch>
+            <a:fillRect/>
+          </a:stretch>
+        </p:blipFill>
+        <p:spPr bwMode="auto">
+          <a:xfrm>
+            <a:off x="27287702" y="3700642"/>
+            <a:ext cx="4417413" cy="2500133"/>
+          </a:xfrm>
+          <a:prstGeom prst="rect">
+            <a:avLst/>
+          </a:prstGeom>
+          <a:noFill/>
+          <a:extLst>
+            <a:ext uri="{909E8E84-426E-40DD-AFC4-6F175D3DCCD1}">
+              <a14:hiddenFill xmlns:a14="http://schemas.microsoft.com/office/drawing/2010/main">
+                <a:solidFill>
+                  <a:srgbClr val="FFFFFF"/>
+                </a:solidFill>
+              </a14:hiddenFill>
+            </a:ext>
+          </a:extLst>
+        </p:spPr>
+      </p:pic>
+      <p:sp>
+        <p:nvSpPr>
+          <p:cNvPr id="8" name="Oval 7">
+            <a:extLst>
+              <a:ext uri="{FF2B5EF4-FFF2-40B4-BE49-F238E27FC236}">
+                <a16:creationId xmlns:a16="http://schemas.microsoft.com/office/drawing/2014/main" id="{40720BAE-7A29-DB29-4377-547C5B36E794}"/>
+              </a:ext>
+            </a:extLst>
+          </p:cNvPr>
+          <p:cNvSpPr/>
+          <p:nvPr/>
+        </p:nvSpPr>
+        <p:spPr>
+          <a:xfrm>
+            <a:off x="28254149" y="4544114"/>
+            <a:ext cx="243192" cy="247849"/>
+          </a:xfrm>
+          <a:prstGeom prst="ellipse">
+            <a:avLst/>
+          </a:prstGeom>
+          <a:noFill/>
+          <a:ln w="19050">
+            <a:solidFill>
+              <a:srgbClr val="FF0000"/>
+            </a:solidFill>
+          </a:ln>
+        </p:spPr>
+        <p:style>
+          <a:lnRef idx="1">
+            <a:schemeClr val="accent1"/>
+          </a:lnRef>
+          <a:fillRef idx="3">
+            <a:schemeClr val="accent1"/>
+          </a:fillRef>
+          <a:effectRef idx="2">
+            <a:schemeClr val="accent1"/>
+          </a:effectRef>
+          <a:fontRef idx="minor">
+            <a:schemeClr val="lt1"/>
+          </a:fontRef>
+        </p:style>
+        <p:txBody>
+          <a:bodyPr rtlCol="0" anchor="ctr"/>
+          <a:lstStyle/>
+          <a:p>
+            <a:pPr algn="ctr"/>
+            <a:endParaRPr lang="en-US"/>
+          </a:p>
+        </p:txBody>
+      </p:sp>
+      <p:sp>
+        <p:nvSpPr>
+          <p:cNvPr id="23" name="Oval 22">
+            <a:extLst>
+              <a:ext uri="{FF2B5EF4-FFF2-40B4-BE49-F238E27FC236}">
+                <a16:creationId xmlns:a16="http://schemas.microsoft.com/office/drawing/2014/main" id="{B1787C5B-172B-52A1-3A9B-966F59CF716F}"/>
+              </a:ext>
+            </a:extLst>
+          </p:cNvPr>
+          <p:cNvSpPr/>
+          <p:nvPr/>
+        </p:nvSpPr>
+        <p:spPr>
+          <a:xfrm>
+            <a:off x="28922115" y="4754880"/>
+            <a:ext cx="664723" cy="324255"/>
+          </a:xfrm>
+          <a:prstGeom prst="ellipse">
+            <a:avLst/>
+          </a:prstGeom>
+          <a:noFill/>
+          <a:ln w="19050">
+            <a:solidFill>
+              <a:srgbClr val="FF0000"/>
+            </a:solidFill>
+          </a:ln>
+        </p:spPr>
+        <p:style>
+          <a:lnRef idx="1">
+            <a:schemeClr val="accent1"/>
+          </a:lnRef>
+          <a:fillRef idx="3">
+            <a:schemeClr val="accent1"/>
+          </a:fillRef>
+          <a:effectRef idx="2">
+            <a:schemeClr val="accent1"/>
+          </a:effectRef>
+          <a:fontRef idx="minor">
+            <a:schemeClr val="lt1"/>
+          </a:fontRef>
+        </p:style>
+        <p:txBody>
+          <a:bodyPr rtlCol="0" anchor="ctr"/>
+          <a:lstStyle/>
+          <a:p>
+            <a:pPr algn="ctr"/>
+            <a:endParaRPr lang="en-US"/>
+          </a:p>
+        </p:txBody>
+      </p:sp>
+      <p:sp>
+        <p:nvSpPr>
+          <p:cNvPr id="25" name="Oval 24">
+            <a:extLst>
+              <a:ext uri="{FF2B5EF4-FFF2-40B4-BE49-F238E27FC236}">
+                <a16:creationId xmlns:a16="http://schemas.microsoft.com/office/drawing/2014/main" id="{1A797C2D-1C4E-D36B-8178-FB790CB35902}"/>
+              </a:ext>
+            </a:extLst>
+          </p:cNvPr>
+          <p:cNvSpPr/>
+          <p:nvPr/>
+        </p:nvSpPr>
+        <p:spPr>
+          <a:xfrm>
+            <a:off x="30186710" y="4511685"/>
+            <a:ext cx="243192" cy="247849"/>
+          </a:xfrm>
+          <a:prstGeom prst="ellipse">
+            <a:avLst/>
+          </a:prstGeom>
+          <a:noFill/>
+          <a:ln w="19050">
+            <a:solidFill>
+              <a:srgbClr val="FF0000"/>
+            </a:solidFill>
+          </a:ln>
+        </p:spPr>
+        <p:style>
+          <a:lnRef idx="1">
+            <a:schemeClr val="accent1"/>
+          </a:lnRef>
+          <a:fillRef idx="3">
+            <a:schemeClr val="accent1"/>
+          </a:fillRef>
+          <a:effectRef idx="2">
+            <a:schemeClr val="accent1"/>
+          </a:effectRef>
+          <a:fontRef idx="minor">
+            <a:schemeClr val="lt1"/>
+          </a:fontRef>
+        </p:style>
+        <p:txBody>
+          <a:bodyPr rtlCol="0" anchor="ctr"/>
+          <a:lstStyle/>
+          <a:p>
+            <a:pPr algn="ctr"/>
+            <a:endParaRPr lang="en-US"/>
+          </a:p>
+        </p:txBody>
+      </p:sp>
+      <p:sp>
+        <p:nvSpPr>
+          <p:cNvPr id="9" name="TextBox 8">
+            <a:extLst>
+              <a:ext uri="{FF2B5EF4-FFF2-40B4-BE49-F238E27FC236}">
+                <a16:creationId xmlns:a16="http://schemas.microsoft.com/office/drawing/2014/main" id="{1048366A-004E-F924-ADBF-287F84620C24}"/>
+              </a:ext>
+            </a:extLst>
+          </p:cNvPr>
+          <p:cNvSpPr txBox="1"/>
+          <p:nvPr/>
+        </p:nvSpPr>
+        <p:spPr>
+          <a:xfrm>
+            <a:off x="23190743" y="6300543"/>
+            <a:ext cx="8572740" cy="369332"/>
+          </a:xfrm>
+          <a:prstGeom prst="rect">
+            <a:avLst/>
+          </a:prstGeom>
+          <a:noFill/>
+        </p:spPr>
+        <p:txBody>
+          <a:bodyPr wrap="square" rtlCol="0">
+            <a:spAutoFit/>
+          </a:bodyPr>
+          <a:lstStyle/>
+          <a:p>
+            <a:r>
+              <a:rPr lang="en-US" sz="1800" dirty="0"/>
+              <a:t>Figure 1. Detected Objects for Frame #3 (left) and Frame #112 (right) of 807-2 Test Clips.</a:t>
             </a:r>
           </a:p>
         </p:txBody>

</xml_diff>

<commit_message>
Added Methods talking points
</commit_message>
<xml_diff>
--- a/submission/project-poster.pptx
+++ b/submission/project-poster.pptx
@@ -4013,7 +4013,7 @@
         <p:spPr>
           <a:xfrm>
             <a:off x="11044989" y="3633537"/>
-            <a:ext cx="10467473" cy="3662541"/>
+            <a:ext cx="10467473" cy="11541621"/>
           </a:xfrm>
           <a:prstGeom prst="rect">
             <a:avLst/>
@@ -4035,7 +4035,7 @@
                 <a:latin typeface="Times New Roman" panose="02020603050405020304" pitchFamily="18" charset="0"/>
                 <a:cs typeface="Times New Roman" panose="02020603050405020304" pitchFamily="18" charset="0"/>
               </a:rPr>
-              <a:t>Object Detection Model:</a:t>
+              <a:t>Source Feature Point Detection</a:t>
             </a:r>
           </a:p>
           <a:p>
@@ -4044,18 +4044,148 @@
               <a:buChar char="•"/>
             </a:pPr>
             <a:r>
-              <a:rPr lang="en-US" sz="3200">
-                <a:latin typeface="Times New Roman" panose="02020603050405020304" pitchFamily="18" charset="0"/>
-                <a:cs typeface="Times New Roman" panose="02020603050405020304" pitchFamily="18" charset="0"/>
-              </a:rPr>
-              <a:t>Self-Labeled </a:t>
-            </a:r>
-            <a:r>
               <a:rPr lang="en-US" sz="3200" dirty="0">
                 <a:latin typeface="Times New Roman" panose="02020603050405020304" pitchFamily="18" charset="0"/>
                 <a:cs typeface="Times New Roman" panose="02020603050405020304" pitchFamily="18" charset="0"/>
               </a:rPr>
-              <a:t>Image Dataset</a:t>
+              <a:t>- Filter Hue channel</a:t>
+            </a:r>
+          </a:p>
+          <a:p>
+            <a:pPr marL="2139010" lvl="1" indent="-571500">
+              <a:buFont typeface="Arial" panose="020B0604020202020204" pitchFamily="34" charset="0"/>
+              <a:buChar char="•"/>
+            </a:pPr>
+            <a:r>
+              <a:rPr lang="en-US" sz="3200" dirty="0">
+                <a:latin typeface="Times New Roman" panose="02020603050405020304" pitchFamily="18" charset="0"/>
+                <a:cs typeface="Times New Roman" panose="02020603050405020304" pitchFamily="18" charset="0"/>
+              </a:rPr>
+              <a:t>- Apply grayscale thresholding</a:t>
+            </a:r>
+          </a:p>
+          <a:p>
+            <a:pPr marL="2139010" lvl="1" indent="-571500">
+              <a:buFont typeface="Arial" panose="020B0604020202020204" pitchFamily="34" charset="0"/>
+              <a:buChar char="•"/>
+            </a:pPr>
+            <a:r>
+              <a:rPr lang="en-US" sz="3200" dirty="0">
+                <a:latin typeface="Times New Roman" panose="02020603050405020304" pitchFamily="18" charset="0"/>
+                <a:cs typeface="Times New Roman" panose="02020603050405020304" pitchFamily="18" charset="0"/>
+              </a:rPr>
+              <a:t>- Apply Hough Transformation</a:t>
+            </a:r>
+          </a:p>
+          <a:p>
+            <a:pPr marL="2139010" lvl="1" indent="-571500">
+              <a:buFont typeface="Arial" panose="020B0604020202020204" pitchFamily="34" charset="0"/>
+              <a:buChar char="•"/>
+            </a:pPr>
+            <a:r>
+              <a:rPr lang="en-US" sz="3200" dirty="0">
+                <a:latin typeface="Times New Roman" panose="02020603050405020304" pitchFamily="18" charset="0"/>
+                <a:cs typeface="Times New Roman" panose="02020603050405020304" pitchFamily="18" charset="0"/>
+              </a:rPr>
+              <a:t>- Solve for the valid intersections</a:t>
+            </a:r>
+          </a:p>
+          <a:p>
+            <a:pPr marL="2139010" lvl="1" indent="-571500">
+              <a:buFont typeface="Arial" panose="020B0604020202020204" pitchFamily="34" charset="0"/>
+              <a:buChar char="•"/>
+            </a:pPr>
+            <a:endParaRPr lang="en-US" sz="3200" dirty="0">
+              <a:latin typeface="Times New Roman" panose="02020603050405020304" pitchFamily="18" charset="0"/>
+              <a:cs typeface="Times New Roman" panose="02020603050405020304" pitchFamily="18" charset="0"/>
+            </a:endParaRPr>
+          </a:p>
+          <a:p>
+            <a:pPr marL="571500" indent="-571500">
+              <a:buFont typeface="Arial" panose="020B0604020202020204" pitchFamily="34" charset="0"/>
+              <a:buChar char="•"/>
+            </a:pPr>
+            <a:r>
+              <a:rPr lang="en-US" sz="3200" dirty="0">
+                <a:latin typeface="Times New Roman" panose="02020603050405020304" pitchFamily="18" charset="0"/>
+                <a:cs typeface="Times New Roman" panose="02020603050405020304" pitchFamily="18" charset="0"/>
+              </a:rPr>
+              <a:t>Solve Projection Matrix</a:t>
+            </a:r>
+          </a:p>
+          <a:p>
+            <a:pPr marL="2139010" lvl="1" indent="-571500">
+              <a:buFont typeface="Arial" panose="020B0604020202020204" pitchFamily="34" charset="0"/>
+              <a:buChar char="•"/>
+            </a:pPr>
+            <a:r>
+              <a:rPr lang="en-US" sz="3200" dirty="0">
+                <a:latin typeface="Times New Roman" panose="02020603050405020304" pitchFamily="18" charset="0"/>
+                <a:cs typeface="Times New Roman" panose="02020603050405020304" pitchFamily="18" charset="0"/>
+              </a:rPr>
+              <a:t>- Select 4 feature points</a:t>
+            </a:r>
+          </a:p>
+          <a:p>
+            <a:pPr marL="2139010" lvl="1" indent="-571500">
+              <a:buFont typeface="Arial" panose="020B0604020202020204" pitchFamily="34" charset="0"/>
+              <a:buChar char="•"/>
+            </a:pPr>
+            <a:r>
+              <a:rPr lang="en-US" sz="3200" dirty="0">
+                <a:latin typeface="Times New Roman" panose="02020603050405020304" pitchFamily="18" charset="0"/>
+                <a:cs typeface="Times New Roman" panose="02020603050405020304" pitchFamily="18" charset="0"/>
+              </a:rPr>
+              <a:t>- Test destination combinations</a:t>
+            </a:r>
+          </a:p>
+          <a:p>
+            <a:pPr marL="2139010" lvl="1" indent="-571500">
+              <a:buFont typeface="Arial" panose="020B0604020202020204" pitchFamily="34" charset="0"/>
+              <a:buChar char="•"/>
+            </a:pPr>
+            <a:r>
+              <a:rPr lang="en-US" sz="3200" dirty="0">
+                <a:latin typeface="Times New Roman" panose="02020603050405020304" pitchFamily="18" charset="0"/>
+                <a:cs typeface="Times New Roman" panose="02020603050405020304" pitchFamily="18" charset="0"/>
+              </a:rPr>
+              <a:t>- Vote based on inverse projection</a:t>
+            </a:r>
+          </a:p>
+          <a:p>
+            <a:pPr marL="2139010" lvl="1" indent="-571500">
+              <a:buFont typeface="Arial" panose="020B0604020202020204" pitchFamily="34" charset="0"/>
+              <a:buChar char="•"/>
+            </a:pPr>
+            <a:endParaRPr lang="en-US" sz="3200" dirty="0">
+              <a:latin typeface="Times New Roman" panose="02020603050405020304" pitchFamily="18" charset="0"/>
+              <a:cs typeface="Times New Roman" panose="02020603050405020304" pitchFamily="18" charset="0"/>
+            </a:endParaRPr>
+          </a:p>
+          <a:p>
+            <a:pPr marL="571500" indent="-571500">
+              <a:buFont typeface="Arial" panose="020B0604020202020204" pitchFamily="34" charset="0"/>
+              <a:buChar char="•"/>
+            </a:pPr>
+            <a:r>
+              <a:rPr lang="en-US" sz="3200" dirty="0">
+                <a:latin typeface="Times New Roman" panose="02020603050405020304" pitchFamily="18" charset="0"/>
+                <a:cs typeface="Times New Roman" panose="02020603050405020304" pitchFamily="18" charset="0"/>
+              </a:rPr>
+              <a:t>Object Detection</a:t>
+            </a:r>
+          </a:p>
+          <a:p>
+            <a:pPr marL="2139010" lvl="1" indent="-571500">
+              <a:buFont typeface="Arial" panose="020B0604020202020204" pitchFamily="34" charset="0"/>
+              <a:buChar char="•"/>
+            </a:pPr>
+            <a:r>
+              <a:rPr lang="en-US" sz="3200" dirty="0">
+                <a:latin typeface="Times New Roman" panose="02020603050405020304" pitchFamily="18" charset="0"/>
+                <a:cs typeface="Times New Roman" panose="02020603050405020304" pitchFamily="18" charset="0"/>
+              </a:rPr>
+              <a:t>Self-Labeled Image Dataset</a:t>
             </a:r>
           </a:p>
           <a:p>
@@ -4082,6 +4212,68 @@
                 <a:cs typeface="Times New Roman" panose="02020603050405020304" pitchFamily="18" charset="0"/>
               </a:rPr>
               <a:t>Pre-Trained Model: Faster R-CNN with the COCO Dataset</a:t>
+            </a:r>
+          </a:p>
+          <a:p>
+            <a:pPr marL="571500" indent="-571500">
+              <a:buFont typeface="Arial" panose="020B0604020202020204" pitchFamily="34" charset="0"/>
+              <a:buChar char="•"/>
+            </a:pPr>
+            <a:endParaRPr lang="en-US" sz="3200" dirty="0">
+              <a:latin typeface="Times New Roman" panose="02020603050405020304" pitchFamily="18" charset="0"/>
+              <a:cs typeface="Times New Roman" panose="02020603050405020304" pitchFamily="18" charset="0"/>
+            </a:endParaRPr>
+          </a:p>
+          <a:p>
+            <a:pPr marL="571500" indent="-571500">
+              <a:buFont typeface="Arial" panose="020B0604020202020204" pitchFamily="34" charset="0"/>
+              <a:buChar char="•"/>
+            </a:pPr>
+            <a:r>
+              <a:rPr lang="en-US" sz="3200" dirty="0">
+                <a:latin typeface="Times New Roman" panose="02020603050405020304" pitchFamily="18" charset="0"/>
+                <a:cs typeface="Times New Roman" panose="02020603050405020304" pitchFamily="18" charset="0"/>
+              </a:rPr>
+              <a:t>Apply Projection</a:t>
+            </a:r>
+          </a:p>
+          <a:p>
+            <a:pPr marL="2139010" lvl="1" indent="-571500">
+              <a:buFont typeface="Arial" panose="020B0604020202020204" pitchFamily="34" charset="0"/>
+              <a:buChar char="•"/>
+            </a:pPr>
+            <a:r>
+              <a:rPr lang="en-US" sz="3200" dirty="0">
+                <a:latin typeface="Times New Roman" panose="02020603050405020304" pitchFamily="18" charset="0"/>
+                <a:cs typeface="Times New Roman" panose="02020603050405020304" pitchFamily="18" charset="0"/>
+              </a:rPr>
+              <a:t>- Ingest projection matrix and objects</a:t>
+            </a:r>
+          </a:p>
+          <a:p>
+            <a:pPr marL="2139010" lvl="1" indent="-571500">
+              <a:buFont typeface="Arial" panose="020B0604020202020204" pitchFamily="34" charset="0"/>
+              <a:buChar char="•"/>
+            </a:pPr>
+            <a:r>
+              <a:rPr lang="en-US" sz="3200" dirty="0">
+                <a:latin typeface="Times New Roman" panose="02020603050405020304" pitchFamily="18" charset="0"/>
+                <a:cs typeface="Times New Roman" panose="02020603050405020304" pitchFamily="18" charset="0"/>
+              </a:rPr>
+              <a:t>- Apply projection to object</a:t>
+            </a:r>
+          </a:p>
+          <a:p>
+            <a:pPr marL="2139010" lvl="1" indent="-571500">
+              <a:buFont typeface="Arial" panose="020B0604020202020204" pitchFamily="34" charset="0"/>
+              <a:buChar char="•"/>
+            </a:pPr>
+            <a:r>
+              <a:rPr lang="en-US" sz="3200" dirty="0">
+                <a:latin typeface="Times New Roman" panose="02020603050405020304" pitchFamily="18" charset="0"/>
+                <a:cs typeface="Times New Roman" panose="02020603050405020304" pitchFamily="18" charset="0"/>
+              </a:rPr>
+              <a:t>- Plot objects in destination </a:t>
             </a:r>
           </a:p>
           <a:p>

</xml_diff>